<commit_message>
modified 2d array program
</commit_message>
<xml_diff>
--- a/notes/intro-2.pptx
+++ b/notes/intro-2.pptx
@@ -5,7 +5,7 @@
     <p:sldMasterId id="2147483648" r:id="rId1"/>
   </p:sldMasterIdLst>
   <p:notesMasterIdLst>
-    <p:notesMasterId r:id="rId42"/>
+    <p:notesMasterId r:id="rId43"/>
   </p:notesMasterIdLst>
   <p:sldIdLst>
     <p:sldId id="256" r:id="rId2"/>
@@ -48,6 +48,7 @@
     <p:sldId id="287" r:id="rId39"/>
     <p:sldId id="288" r:id="rId40"/>
     <p:sldId id="289" r:id="rId41"/>
+    <p:sldId id="297" r:id="rId42"/>
   </p:sldIdLst>
   <p:sldSz cx="9144000" cy="6858000" type="screen4x3"/>
   <p:notesSz cx="6858000" cy="9144000"/>
@@ -232,7 +233,7 @@
             <a:fld id="{B30CEBCF-6D1A-4E96-914A-F3AA564DE1BB}" type="datetimeFigureOut">
               <a:rPr lang="en-US" smtClean="0"/>
               <a:pPr/>
-              <a:t>3/13/2024</a:t>
+              <a:t>3/25/2024</a:t>
             </a:fld>
             <a:endParaRPr lang="en-US"/>
           </a:p>
@@ -762,7 +763,7 @@
             <a:fld id="{1D8BD707-D9CF-40AE-B4C6-C98DA3205C09}" type="datetimeFigureOut">
               <a:rPr lang="en-US" smtClean="0"/>
               <a:pPr/>
-              <a:t>3/13/2024</a:t>
+              <a:t>3/25/2024</a:t>
             </a:fld>
             <a:endParaRPr lang="en-US"/>
           </a:p>
@@ -929,7 +930,7 @@
             <a:fld id="{1D8BD707-D9CF-40AE-B4C6-C98DA3205C09}" type="datetimeFigureOut">
               <a:rPr lang="en-US" smtClean="0"/>
               <a:pPr/>
-              <a:t>3/13/2024</a:t>
+              <a:t>3/25/2024</a:t>
             </a:fld>
             <a:endParaRPr lang="en-US"/>
           </a:p>
@@ -1106,7 +1107,7 @@
             <a:fld id="{1D8BD707-D9CF-40AE-B4C6-C98DA3205C09}" type="datetimeFigureOut">
               <a:rPr lang="en-US" smtClean="0"/>
               <a:pPr/>
-              <a:t>3/13/2024</a:t>
+              <a:t>3/25/2024</a:t>
             </a:fld>
             <a:endParaRPr lang="en-US"/>
           </a:p>
@@ -1273,7 +1274,7 @@
             <a:fld id="{1D8BD707-D9CF-40AE-B4C6-C98DA3205C09}" type="datetimeFigureOut">
               <a:rPr lang="en-US" smtClean="0"/>
               <a:pPr/>
-              <a:t>3/13/2024</a:t>
+              <a:t>3/25/2024</a:t>
             </a:fld>
             <a:endParaRPr lang="en-US"/>
           </a:p>
@@ -1516,7 +1517,7 @@
             <a:fld id="{1D8BD707-D9CF-40AE-B4C6-C98DA3205C09}" type="datetimeFigureOut">
               <a:rPr lang="en-US" smtClean="0"/>
               <a:pPr/>
-              <a:t>3/13/2024</a:t>
+              <a:t>3/25/2024</a:t>
             </a:fld>
             <a:endParaRPr lang="en-US"/>
           </a:p>
@@ -1801,7 +1802,7 @@
             <a:fld id="{1D8BD707-D9CF-40AE-B4C6-C98DA3205C09}" type="datetimeFigureOut">
               <a:rPr lang="en-US" smtClean="0"/>
               <a:pPr/>
-              <a:t>3/13/2024</a:t>
+              <a:t>3/25/2024</a:t>
             </a:fld>
             <a:endParaRPr lang="en-US"/>
           </a:p>
@@ -2220,7 +2221,7 @@
             <a:fld id="{1D8BD707-D9CF-40AE-B4C6-C98DA3205C09}" type="datetimeFigureOut">
               <a:rPr lang="en-US" smtClean="0"/>
               <a:pPr/>
-              <a:t>3/13/2024</a:t>
+              <a:t>3/25/2024</a:t>
             </a:fld>
             <a:endParaRPr lang="en-US"/>
           </a:p>
@@ -2335,7 +2336,7 @@
             <a:fld id="{1D8BD707-D9CF-40AE-B4C6-C98DA3205C09}" type="datetimeFigureOut">
               <a:rPr lang="en-US" smtClean="0"/>
               <a:pPr/>
-              <a:t>3/13/2024</a:t>
+              <a:t>3/25/2024</a:t>
             </a:fld>
             <a:endParaRPr lang="en-US"/>
           </a:p>
@@ -2427,7 +2428,7 @@
             <a:fld id="{1D8BD707-D9CF-40AE-B4C6-C98DA3205C09}" type="datetimeFigureOut">
               <a:rPr lang="en-US" smtClean="0"/>
               <a:pPr/>
-              <a:t>3/13/2024</a:t>
+              <a:t>3/25/2024</a:t>
             </a:fld>
             <a:endParaRPr lang="en-US"/>
           </a:p>
@@ -2701,7 +2702,7 @@
             <a:fld id="{1D8BD707-D9CF-40AE-B4C6-C98DA3205C09}" type="datetimeFigureOut">
               <a:rPr lang="en-US" smtClean="0"/>
               <a:pPr/>
-              <a:t>3/13/2024</a:t>
+              <a:t>3/25/2024</a:t>
             </a:fld>
             <a:endParaRPr lang="en-US"/>
           </a:p>
@@ -2951,7 +2952,7 @@
             <a:fld id="{1D8BD707-D9CF-40AE-B4C6-C98DA3205C09}" type="datetimeFigureOut">
               <a:rPr lang="en-US" smtClean="0"/>
               <a:pPr/>
-              <a:t>3/13/2024</a:t>
+              <a:t>3/25/2024</a:t>
             </a:fld>
             <a:endParaRPr lang="en-US"/>
           </a:p>
@@ -3161,7 +3162,7 @@
             <a:fld id="{1D8BD707-D9CF-40AE-B4C6-C98DA3205C09}" type="datetimeFigureOut">
               <a:rPr lang="en-US" smtClean="0"/>
               <a:pPr/>
-              <a:t>3/13/2024</a:t>
+              <a:t>3/25/2024</a:t>
             </a:fld>
             <a:endParaRPr lang="en-US"/>
           </a:p>
@@ -13527,7 +13528,7 @@
       </p:grpSpPr>
       <p:pic>
         <p:nvPicPr>
-          <p:cNvPr id="49154" name="Picture 2"/>
+          <p:cNvPr id="1026" name="Picture 2"/>
           <p:cNvPicPr>
             <a:picLocks noChangeAspect="1" noChangeArrowheads="1"/>
           </p:cNvPicPr>
@@ -13543,40 +13544,7 @@
         <p:spPr bwMode="auto">
           <a:xfrm>
             <a:off x="0" y="0"/>
-            <a:ext cx="4905375" cy="4219575"/>
-          </a:xfrm>
-          <a:prstGeom prst="rect">
-            <a:avLst/>
-          </a:prstGeom>
-          <a:noFill/>
-          <a:ln w="9525">
-            <a:noFill/>
-            <a:miter lim="800000"/>
-            <a:headEnd/>
-            <a:tailEnd/>
-          </a:ln>
-          <a:effectLst/>
-        </p:spPr>
-      </p:pic>
-      <p:pic>
-        <p:nvPicPr>
-          <p:cNvPr id="49155" name="Picture 3"/>
-          <p:cNvPicPr>
-            <a:picLocks noChangeAspect="1" noChangeArrowheads="1"/>
-          </p:cNvPicPr>
-          <p:nvPr/>
-        </p:nvPicPr>
-        <p:blipFill>
-          <a:blip r:embed="rId3"/>
-          <a:srcRect/>
-          <a:stretch>
-            <a:fillRect/>
-          </a:stretch>
-        </p:blipFill>
-        <p:spPr bwMode="auto">
-          <a:xfrm>
-            <a:off x="3028950" y="3409950"/>
-            <a:ext cx="6115050" cy="3448050"/>
+            <a:ext cx="8610600" cy="4591050"/>
           </a:xfrm>
           <a:prstGeom prst="rect">
             <a:avLst/>
@@ -13603,6 +13571,97 @@
       </p:par>
     </p:tnLst>
   </p:timing>
+</p:sld>
+</file>
+
+<file path=ppt/slides/slide41.xml><?xml version="1.0" encoding="utf-8"?>
+<p:sld xmlns:a="http://schemas.openxmlformats.org/drawingml/2006/main" xmlns:r="http://schemas.openxmlformats.org/officeDocument/2006/relationships" xmlns:p="http://schemas.openxmlformats.org/presentationml/2006/main">
+  <p:cSld>
+    <p:spTree>
+      <p:nvGrpSpPr>
+        <p:cNvPr id="1" name=""/>
+        <p:cNvGrpSpPr/>
+        <p:nvPr/>
+      </p:nvGrpSpPr>
+      <p:grpSpPr>
+        <a:xfrm>
+          <a:off x="0" y="0"/>
+          <a:ext cx="0" cy="0"/>
+          <a:chOff x="0" y="0"/>
+          <a:chExt cx="0" cy="0"/>
+        </a:xfrm>
+      </p:grpSpPr>
+      <p:pic>
+        <p:nvPicPr>
+          <p:cNvPr id="2050" name="Picture 2"/>
+          <p:cNvPicPr>
+            <a:picLocks noChangeAspect="1" noChangeArrowheads="1"/>
+          </p:cNvPicPr>
+          <p:nvPr/>
+        </p:nvPicPr>
+        <p:blipFill>
+          <a:blip r:embed="rId2"/>
+          <a:srcRect/>
+          <a:stretch>
+            <a:fillRect/>
+          </a:stretch>
+        </p:blipFill>
+        <p:spPr bwMode="auto">
+          <a:xfrm>
+            <a:off x="0" y="1"/>
+            <a:ext cx="5943600" cy="3018600"/>
+          </a:xfrm>
+          <a:prstGeom prst="rect">
+            <a:avLst/>
+          </a:prstGeom>
+          <a:noFill/>
+          <a:ln w="9525">
+            <a:noFill/>
+            <a:miter lim="800000"/>
+            <a:headEnd/>
+            <a:tailEnd/>
+          </a:ln>
+          <a:effectLst/>
+        </p:spPr>
+      </p:pic>
+      <p:pic>
+        <p:nvPicPr>
+          <p:cNvPr id="2051" name="Picture 3"/>
+          <p:cNvPicPr>
+            <a:picLocks noChangeAspect="1" noChangeArrowheads="1"/>
+          </p:cNvPicPr>
+          <p:nvPr/>
+        </p:nvPicPr>
+        <p:blipFill>
+          <a:blip r:embed="rId3"/>
+          <a:srcRect/>
+          <a:stretch>
+            <a:fillRect/>
+          </a:stretch>
+        </p:blipFill>
+        <p:spPr bwMode="auto">
+          <a:xfrm>
+            <a:off x="4495800" y="3581400"/>
+            <a:ext cx="3819525" cy="2590800"/>
+          </a:xfrm>
+          <a:prstGeom prst="rect">
+            <a:avLst/>
+          </a:prstGeom>
+          <a:noFill/>
+          <a:ln w="9525">
+            <a:noFill/>
+            <a:miter lim="800000"/>
+            <a:headEnd/>
+            <a:tailEnd/>
+          </a:ln>
+          <a:effectLst/>
+        </p:spPr>
+      </p:pic>
+    </p:spTree>
+  </p:cSld>
+  <p:clrMapOvr>
+    <a:masterClrMapping/>
+  </p:clrMapOvr>
 </p:sld>
 </file>
 

</xml_diff>